<commit_message>
EDA exercise - Version 7
</commit_message>
<xml_diff>
--- a/EDA_presentation.pptx
+++ b/EDA_presentation.pptx
@@ -271,7 +271,7 @@
           <a:p>
             <a:fld id="{9AB3A824-1A51-4B26-AD58-A6D8E14F6C04}" type="datetimeFigureOut">
               <a:rPr lang="en-US" smtClean="0"/>
-              <a:t>3/14/24</a:t>
+              <a:t>3/15/24</a:t>
             </a:fld>
             <a:endParaRPr lang="en-US" dirty="0"/>
           </a:p>
@@ -476,7 +476,7 @@
           <a:p>
             <a:fld id="{D857E33E-8B18-4087-B112-809917729534}" type="datetimeFigureOut">
               <a:rPr lang="en-US" smtClean="0"/>
-              <a:t>3/14/24</a:t>
+              <a:t>3/15/24</a:t>
             </a:fld>
             <a:endParaRPr lang="en-US" dirty="0"/>
           </a:p>
@@ -691,7 +691,7 @@
           <a:p>
             <a:fld id="{D3FFE419-2371-464F-8239-3959401C3561}" type="datetimeFigureOut">
               <a:rPr lang="en-US" smtClean="0"/>
-              <a:t>3/14/24</a:t>
+              <a:t>3/15/24</a:t>
             </a:fld>
             <a:endParaRPr lang="en-US" dirty="0"/>
           </a:p>
@@ -896,7 +896,7 @@
           <a:p>
             <a:fld id="{97D162C4-EDD9-4389-A98B-B87ECEA2A816}" type="datetimeFigureOut">
               <a:rPr lang="en-US" smtClean="0"/>
-              <a:t>3/14/24</a:t>
+              <a:t>3/15/24</a:t>
             </a:fld>
             <a:endParaRPr lang="en-US" dirty="0"/>
           </a:p>
@@ -1177,7 +1177,7 @@
           <a:p>
             <a:fld id="{3E5059C3-6A89-4494-99FF-5A4D6FFD50EB}" type="datetimeFigureOut">
               <a:rPr lang="en-US" smtClean="0"/>
-              <a:t>3/14/24</a:t>
+              <a:t>3/15/24</a:t>
             </a:fld>
             <a:endParaRPr lang="en-US" dirty="0"/>
           </a:p>
@@ -1450,7 +1450,7 @@
           <a:p>
             <a:fld id="{CA954B2F-12DE-47F5-8894-472B206D2E1E}" type="datetimeFigureOut">
               <a:rPr lang="en-US" smtClean="0"/>
-              <a:t>3/14/24</a:t>
+              <a:t>3/15/24</a:t>
             </a:fld>
             <a:endParaRPr lang="en-US" dirty="0"/>
           </a:p>
@@ -1870,7 +1870,7 @@
           <a:p>
             <a:fld id="{3F30E46F-7819-4ACF-B48B-48222C2ACC88}" type="datetimeFigureOut">
               <a:rPr lang="en-US" smtClean="0"/>
-              <a:t>3/14/24</a:t>
+              <a:t>3/15/24</a:t>
             </a:fld>
             <a:endParaRPr lang="en-US" dirty="0"/>
           </a:p>
@@ -2017,7 +2017,7 @@
           <a:p>
             <a:fld id="{1FAF3416-4057-4DAA-829D-4CA07428D088}" type="datetimeFigureOut">
               <a:rPr lang="en-US" smtClean="0"/>
-              <a:t>3/14/24</a:t>
+              <a:t>3/15/24</a:t>
             </a:fld>
             <a:endParaRPr lang="en-US" dirty="0"/>
           </a:p>
@@ -2135,7 +2135,7 @@
           <a:p>
             <a:fld id="{921D9284-D300-4297-87F7-E791DCC15DB1}" type="datetimeFigureOut">
               <a:rPr lang="en-US" smtClean="0"/>
-              <a:t>3/14/24</a:t>
+              <a:t>3/15/24</a:t>
             </a:fld>
             <a:endParaRPr lang="en-US" dirty="0"/>
           </a:p>
@@ -2453,7 +2453,7 @@
           <a:p>
             <a:fld id="{37D525BB-DA17-4BA0-B3C8-3AC3ABC827E6}" type="datetimeFigureOut">
               <a:rPr lang="en-US" smtClean="0"/>
-              <a:t>3/14/24</a:t>
+              <a:t>3/15/24</a:t>
             </a:fld>
             <a:endParaRPr lang="en-US" dirty="0"/>
           </a:p>
@@ -2747,7 +2747,7 @@
           <a:p>
             <a:fld id="{B16C4C9A-3960-41CF-A4E9-2A8FB932454B}" type="datetimeFigureOut">
               <a:rPr lang="en-US" smtClean="0"/>
-              <a:t>3/14/24</a:t>
+              <a:t>3/15/24</a:t>
             </a:fld>
             <a:endParaRPr lang="en-US" dirty="0"/>
           </a:p>
@@ -2995,7 +2995,7 @@
           <a:p>
             <a:fld id="{3CBC1C18-307B-4F68-A007-B5B542270E8D}" type="datetimeFigureOut">
               <a:rPr lang="en-US" smtClean="0"/>
-              <a:t>3/14/24</a:t>
+              <a:t>3/15/24</a:t>
             </a:fld>
             <a:endParaRPr lang="en-US" dirty="0"/>
           </a:p>
@@ -4560,7 +4560,7 @@
                 <a:latin typeface="Arial" panose="020B0604020202020204" pitchFamily="34" charset="0"/>
                 <a:cs typeface="Arial" panose="020B0604020202020204" pitchFamily="34" charset="0"/>
               </a:rPr>
-              <a:t>The factor that seems to influence the price of historical houses the most is: Grade</a:t>
+              <a:t>The factor that seems to be correlated with the price of historical houses is: Grade</a:t>
             </a:r>
           </a:p>
           <a:p>
@@ -4706,10 +4706,10 @@
       </p:sp>
       <p:pic>
         <p:nvPicPr>
-          <p:cNvPr id="4" name="Picture 3" descr="A graph of a house&#10;&#10;Description automatically generated">
-            <a:extLst>
-              <a:ext uri="{FF2B5EF4-FFF2-40B4-BE49-F238E27FC236}">
-                <a16:creationId xmlns:a16="http://schemas.microsoft.com/office/drawing/2014/main" id="{000A026F-9A7D-43BF-87D4-79B40BA5ACB5}"/>
+          <p:cNvPr id="5" name="Picture 4" descr="A graph of a graph showing a line of a line&#10;&#10;Description automatically generated with medium confidence">
+            <a:extLst>
+              <a:ext uri="{FF2B5EF4-FFF2-40B4-BE49-F238E27FC236}">
+                <a16:creationId xmlns:a16="http://schemas.microsoft.com/office/drawing/2014/main" id="{934B932C-C7A6-9D18-6A57-1FA7671D598A}"/>
               </a:ext>
             </a:extLst>
           </p:cNvPr>
@@ -4720,36 +4720,6 @@
         </p:nvPicPr>
         <p:blipFill>
           <a:blip r:embed="rId2"/>
-          <a:stretch>
-            <a:fillRect/>
-          </a:stretch>
-        </p:blipFill>
-        <p:spPr>
-          <a:xfrm>
-            <a:off x="6495825" y="4647421"/>
-            <a:ext cx="2400000" cy="1800000"/>
-          </a:xfrm>
-          <a:prstGeom prst="rect">
-            <a:avLst/>
-          </a:prstGeom>
-        </p:spPr>
-      </p:pic>
-      <p:pic>
-        <p:nvPicPr>
-          <p:cNvPr id="5" name="Picture 4" descr="A graph of a graph showing a line of a line&#10;&#10;Description automatically generated with medium confidence">
-            <a:extLst>
-              <a:ext uri="{FF2B5EF4-FFF2-40B4-BE49-F238E27FC236}">
-                <a16:creationId xmlns:a16="http://schemas.microsoft.com/office/drawing/2014/main" id="{934B932C-C7A6-9D18-6A57-1FA7671D598A}"/>
-              </a:ext>
-            </a:extLst>
-          </p:cNvPr>
-          <p:cNvPicPr>
-            <a:picLocks noChangeAspect="1"/>
-          </p:cNvPicPr>
-          <p:nvPr/>
-        </p:nvPicPr>
-        <p:blipFill>
-          <a:blip r:embed="rId3"/>
           <a:stretch>
             <a:fillRect/>
           </a:stretch>
@@ -4779,6 +4749,36 @@
           <p:nvPr/>
         </p:nvPicPr>
         <p:blipFill>
+          <a:blip r:embed="rId3"/>
+          <a:stretch>
+            <a:fillRect/>
+          </a:stretch>
+        </p:blipFill>
+        <p:spPr>
+          <a:xfrm>
+            <a:off x="6493665" y="1037370"/>
+            <a:ext cx="2400000" cy="1800000"/>
+          </a:xfrm>
+          <a:prstGeom prst="rect">
+            <a:avLst/>
+          </a:prstGeom>
+        </p:spPr>
+      </p:pic>
+      <p:pic>
+        <p:nvPicPr>
+          <p:cNvPr id="8" name="Picture 7" descr="A graph of a house&#10;&#10;Description automatically generated">
+            <a:extLst>
+              <a:ext uri="{FF2B5EF4-FFF2-40B4-BE49-F238E27FC236}">
+                <a16:creationId xmlns:a16="http://schemas.microsoft.com/office/drawing/2014/main" id="{2A89EDE1-8C1A-22B8-F692-AB20639F659A}"/>
+              </a:ext>
+            </a:extLst>
+          </p:cNvPr>
+          <p:cNvPicPr>
+            <a:picLocks noChangeAspect="1"/>
+          </p:cNvPicPr>
+          <p:nvPr/>
+        </p:nvPicPr>
+        <p:blipFill>
           <a:blip r:embed="rId4"/>
           <a:stretch>
             <a:fillRect/>
@@ -4786,7 +4786,7 @@
         </p:blipFill>
         <p:spPr>
           <a:xfrm>
-            <a:off x="6493665" y="1037370"/>
+            <a:off x="6498537" y="4711068"/>
             <a:ext cx="2400000" cy="1800000"/>
           </a:xfrm>
           <a:prstGeom prst="rect">
@@ -6211,7 +6211,7 @@
                 <a:latin typeface="Arial" panose="020B0604020202020204" pitchFamily="34" charset="0"/>
                 <a:cs typeface="Arial" panose="020B0604020202020204" pitchFamily="34" charset="0"/>
               </a:rPr>
-              <a:t>Are there factors that influence price? If so, which factors could influence price and therefore profit?</a:t>
+              <a:t>Are there factors that are correlated with price? If so, which factors could be correlated with price and therefore profit?</a:t>
             </a:r>
           </a:p>
           <a:p>
@@ -6344,7 +6344,7 @@
         <p:spPr>
           <a:xfrm>
             <a:off x="609599" y="609600"/>
-            <a:ext cx="6347713" cy="735724"/>
+            <a:ext cx="7561635" cy="735724"/>
           </a:xfrm>
         </p:spPr>
         <p:txBody>
@@ -6358,7 +6358,7 @@
                 <a:latin typeface="Arial" panose="020B0604020202020204" pitchFamily="34" charset="0"/>
                 <a:cs typeface="Arial" panose="020B0604020202020204" pitchFamily="34" charset="0"/>
               </a:rPr>
-              <a:t>Which factors influence the price?</a:t>
+              <a:t>Which factors are correlated with the price?</a:t>
             </a:r>
           </a:p>
         </p:txBody>
@@ -6460,12 +6460,334 @@
           </p:txBody>
         </p:sp>
       </p:grpSp>
+      <p:sp>
+        <p:nvSpPr>
+          <p:cNvPr id="3" name="TextBox 2">
+            <a:extLst>
+              <a:ext uri="{FF2B5EF4-FFF2-40B4-BE49-F238E27FC236}">
+                <a16:creationId xmlns:a16="http://schemas.microsoft.com/office/drawing/2014/main" id="{BBD48567-0B95-F3CA-B335-036BDCBE98CA}"/>
+              </a:ext>
+            </a:extLst>
+          </p:cNvPr>
+          <p:cNvSpPr txBox="1"/>
+          <p:nvPr/>
+        </p:nvSpPr>
+        <p:spPr>
+          <a:xfrm>
+            <a:off x="972000" y="5667207"/>
+            <a:ext cx="7199234" cy="707886"/>
+          </a:xfrm>
+          <a:prstGeom prst="rect">
+            <a:avLst/>
+          </a:prstGeom>
+          <a:solidFill>
+            <a:schemeClr val="bg1">
+              <a:lumMod val="85000"/>
+            </a:schemeClr>
+          </a:solidFill>
+        </p:spPr>
+        <p:txBody>
+          <a:bodyPr wrap="square" rtlCol="0">
+            <a:spAutoFit/>
+          </a:bodyPr>
+          <a:lstStyle/>
+          <a:p>
+            <a:pPr algn="just"/>
+            <a:r>
+              <a:rPr lang="de-DE" sz="2000" dirty="0">
+                <a:latin typeface="Arial" panose="020B0604020202020204" pitchFamily="34" charset="0"/>
+                <a:cs typeface="Arial" panose="020B0604020202020204" pitchFamily="34" charset="0"/>
+              </a:rPr>
+              <a:t>The grade </a:t>
+            </a:r>
+            <a:r>
+              <a:rPr lang="de-DE" sz="2000" dirty="0" err="1">
+                <a:latin typeface="Arial" panose="020B0604020202020204" pitchFamily="34" charset="0"/>
+                <a:cs typeface="Arial" panose="020B0604020202020204" pitchFamily="34" charset="0"/>
+              </a:rPr>
+              <a:t>of</a:t>
+            </a:r>
+            <a:r>
+              <a:rPr lang="de-DE" sz="2000" dirty="0">
+                <a:latin typeface="Arial" panose="020B0604020202020204" pitchFamily="34" charset="0"/>
+                <a:cs typeface="Arial" panose="020B0604020202020204" pitchFamily="34" charset="0"/>
+              </a:rPr>
+              <a:t> a </a:t>
+            </a:r>
+            <a:r>
+              <a:rPr lang="de-DE" sz="2000" dirty="0" err="1">
+                <a:latin typeface="Arial" panose="020B0604020202020204" pitchFamily="34" charset="0"/>
+                <a:cs typeface="Arial" panose="020B0604020202020204" pitchFamily="34" charset="0"/>
+              </a:rPr>
+              <a:t>house</a:t>
+            </a:r>
+            <a:r>
+              <a:rPr lang="de-DE" sz="2000" dirty="0">
+                <a:latin typeface="Arial" panose="020B0604020202020204" pitchFamily="34" charset="0"/>
+                <a:cs typeface="Arial" panose="020B0604020202020204" pitchFamily="34" charset="0"/>
+              </a:rPr>
+              <a:t> </a:t>
+            </a:r>
+            <a:r>
+              <a:rPr lang="de-DE" sz="2000" dirty="0" err="1">
+                <a:latin typeface="Arial" panose="020B0604020202020204" pitchFamily="34" charset="0"/>
+                <a:cs typeface="Arial" panose="020B0604020202020204" pitchFamily="34" charset="0"/>
+              </a:rPr>
+              <a:t>seems</a:t>
+            </a:r>
+            <a:r>
+              <a:rPr lang="de-DE" sz="2000" dirty="0">
+                <a:latin typeface="Arial" panose="020B0604020202020204" pitchFamily="34" charset="0"/>
+                <a:cs typeface="Arial" panose="020B0604020202020204" pitchFamily="34" charset="0"/>
+              </a:rPr>
+              <a:t> </a:t>
+            </a:r>
+            <a:r>
+              <a:rPr lang="de-DE" sz="2000" dirty="0" err="1">
+                <a:latin typeface="Arial" panose="020B0604020202020204" pitchFamily="34" charset="0"/>
+                <a:cs typeface="Arial" panose="020B0604020202020204" pitchFamily="34" charset="0"/>
+              </a:rPr>
+              <a:t>to</a:t>
+            </a:r>
+            <a:r>
+              <a:rPr lang="de-DE" sz="2000" dirty="0">
+                <a:latin typeface="Arial" panose="020B0604020202020204" pitchFamily="34" charset="0"/>
+                <a:cs typeface="Arial" panose="020B0604020202020204" pitchFamily="34" charset="0"/>
+              </a:rPr>
+              <a:t> </a:t>
+            </a:r>
+            <a:r>
+              <a:rPr lang="de-DE" sz="2000" dirty="0" err="1">
+                <a:latin typeface="Arial" panose="020B0604020202020204" pitchFamily="34" charset="0"/>
+                <a:cs typeface="Arial" panose="020B0604020202020204" pitchFamily="34" charset="0"/>
+              </a:rPr>
+              <a:t>be</a:t>
+            </a:r>
+            <a:r>
+              <a:rPr lang="de-DE" sz="2000" dirty="0">
+                <a:latin typeface="Arial" panose="020B0604020202020204" pitchFamily="34" charset="0"/>
+                <a:cs typeface="Arial" panose="020B0604020202020204" pitchFamily="34" charset="0"/>
+              </a:rPr>
+              <a:t> </a:t>
+            </a:r>
+            <a:r>
+              <a:rPr lang="de-DE" sz="2000" dirty="0" err="1">
+                <a:latin typeface="Arial" panose="020B0604020202020204" pitchFamily="34" charset="0"/>
+                <a:cs typeface="Arial" panose="020B0604020202020204" pitchFamily="34" charset="0"/>
+              </a:rPr>
+              <a:t>correlated</a:t>
+            </a:r>
+            <a:r>
+              <a:rPr lang="de-DE" sz="2000" dirty="0">
+                <a:latin typeface="Arial" panose="020B0604020202020204" pitchFamily="34" charset="0"/>
+                <a:cs typeface="Arial" panose="020B0604020202020204" pitchFamily="34" charset="0"/>
+              </a:rPr>
+              <a:t> </a:t>
+            </a:r>
+            <a:r>
+              <a:rPr lang="de-DE" sz="2000" dirty="0" err="1">
+                <a:latin typeface="Arial" panose="020B0604020202020204" pitchFamily="34" charset="0"/>
+                <a:cs typeface="Arial" panose="020B0604020202020204" pitchFamily="34" charset="0"/>
+              </a:rPr>
+              <a:t>with</a:t>
+            </a:r>
+            <a:r>
+              <a:rPr lang="de-DE" sz="2000" dirty="0">
+                <a:latin typeface="Arial" panose="020B0604020202020204" pitchFamily="34" charset="0"/>
+                <a:cs typeface="Arial" panose="020B0604020202020204" pitchFamily="34" charset="0"/>
+              </a:rPr>
+              <a:t> </a:t>
+            </a:r>
+            <a:r>
+              <a:rPr lang="de-DE" sz="2000" dirty="0" err="1">
+                <a:latin typeface="Arial" panose="020B0604020202020204" pitchFamily="34" charset="0"/>
+                <a:cs typeface="Arial" panose="020B0604020202020204" pitchFamily="34" charset="0"/>
+              </a:rPr>
+              <a:t>the</a:t>
+            </a:r>
+            <a:r>
+              <a:rPr lang="de-DE" sz="2000" dirty="0">
+                <a:latin typeface="Arial" panose="020B0604020202020204" pitchFamily="34" charset="0"/>
+                <a:cs typeface="Arial" panose="020B0604020202020204" pitchFamily="34" charset="0"/>
+              </a:rPr>
+              <a:t> </a:t>
+            </a:r>
+            <a:r>
+              <a:rPr lang="de-DE" sz="2000" dirty="0" err="1">
+                <a:latin typeface="Arial" panose="020B0604020202020204" pitchFamily="34" charset="0"/>
+                <a:cs typeface="Arial" panose="020B0604020202020204" pitchFamily="34" charset="0"/>
+              </a:rPr>
+              <a:t>price</a:t>
+            </a:r>
+            <a:r>
+              <a:rPr lang="de-DE" sz="2000" dirty="0">
+                <a:latin typeface="Arial" panose="020B0604020202020204" pitchFamily="34" charset="0"/>
+                <a:cs typeface="Arial" panose="020B0604020202020204" pitchFamily="34" charset="0"/>
+              </a:rPr>
+              <a:t> </a:t>
+            </a:r>
+            <a:r>
+              <a:rPr lang="de-DE" sz="2000" dirty="0" err="1">
+                <a:latin typeface="Arial" panose="020B0604020202020204" pitchFamily="34" charset="0"/>
+                <a:cs typeface="Arial" panose="020B0604020202020204" pitchFamily="34" charset="0"/>
+              </a:rPr>
+              <a:t>of</a:t>
+            </a:r>
+            <a:r>
+              <a:rPr lang="de-DE" sz="2000" dirty="0">
+                <a:latin typeface="Arial" panose="020B0604020202020204" pitchFamily="34" charset="0"/>
+                <a:cs typeface="Arial" panose="020B0604020202020204" pitchFamily="34" charset="0"/>
+              </a:rPr>
+              <a:t> a </a:t>
+            </a:r>
+            <a:r>
+              <a:rPr lang="de-DE" sz="2000" dirty="0" err="1">
+                <a:latin typeface="Arial" panose="020B0604020202020204" pitchFamily="34" charset="0"/>
+                <a:cs typeface="Arial" panose="020B0604020202020204" pitchFamily="34" charset="0"/>
+              </a:rPr>
+              <a:t>historic</a:t>
+            </a:r>
+            <a:r>
+              <a:rPr lang="de-DE" sz="2000" dirty="0">
+                <a:latin typeface="Arial" panose="020B0604020202020204" pitchFamily="34" charset="0"/>
+                <a:cs typeface="Arial" panose="020B0604020202020204" pitchFamily="34" charset="0"/>
+              </a:rPr>
+              <a:t> </a:t>
+            </a:r>
+            <a:r>
+              <a:rPr lang="de-DE" sz="2000" dirty="0" err="1">
+                <a:latin typeface="Arial" panose="020B0604020202020204" pitchFamily="34" charset="0"/>
+                <a:cs typeface="Arial" panose="020B0604020202020204" pitchFamily="34" charset="0"/>
+              </a:rPr>
+              <a:t>house</a:t>
+            </a:r>
+            <a:r>
+              <a:rPr lang="de-DE" sz="2000" dirty="0">
+                <a:latin typeface="Arial" panose="020B0604020202020204" pitchFamily="34" charset="0"/>
+                <a:cs typeface="Arial" panose="020B0604020202020204" pitchFamily="34" charset="0"/>
+              </a:rPr>
+              <a:t>, but not </a:t>
+            </a:r>
+            <a:r>
+              <a:rPr lang="de-DE" sz="2000" dirty="0" err="1">
+                <a:latin typeface="Arial" panose="020B0604020202020204" pitchFamily="34" charset="0"/>
+                <a:cs typeface="Arial" panose="020B0604020202020204" pitchFamily="34" charset="0"/>
+              </a:rPr>
+              <a:t>the</a:t>
+            </a:r>
+            <a:r>
+              <a:rPr lang="de-DE" sz="2000" dirty="0">
+                <a:latin typeface="Arial" panose="020B0604020202020204" pitchFamily="34" charset="0"/>
+                <a:cs typeface="Arial" panose="020B0604020202020204" pitchFamily="34" charset="0"/>
+              </a:rPr>
+              <a:t> </a:t>
+            </a:r>
+            <a:r>
+              <a:rPr lang="de-DE" sz="2000" dirty="0" err="1">
+                <a:latin typeface="Arial" panose="020B0604020202020204" pitchFamily="34" charset="0"/>
+                <a:cs typeface="Arial" panose="020B0604020202020204" pitchFamily="34" charset="0"/>
+              </a:rPr>
+              <a:t>condition</a:t>
+            </a:r>
+            <a:r>
+              <a:rPr lang="de-DE" sz="2000" dirty="0">
+                <a:latin typeface="Arial" panose="020B0604020202020204" pitchFamily="34" charset="0"/>
+                <a:cs typeface="Arial" panose="020B0604020202020204" pitchFamily="34" charset="0"/>
+              </a:rPr>
+              <a:t> </a:t>
+            </a:r>
+            <a:r>
+              <a:rPr lang="de-DE" sz="2000" dirty="0" err="1">
+                <a:latin typeface="Arial" panose="020B0604020202020204" pitchFamily="34" charset="0"/>
+                <a:cs typeface="Arial" panose="020B0604020202020204" pitchFamily="34" charset="0"/>
+              </a:rPr>
+              <a:t>of</a:t>
+            </a:r>
+            <a:r>
+              <a:rPr lang="de-DE" sz="2000" dirty="0">
+                <a:latin typeface="Arial" panose="020B0604020202020204" pitchFamily="34" charset="0"/>
+                <a:cs typeface="Arial" panose="020B0604020202020204" pitchFamily="34" charset="0"/>
+              </a:rPr>
+              <a:t> a </a:t>
+            </a:r>
+            <a:r>
+              <a:rPr lang="de-DE" sz="2000" dirty="0" err="1">
+                <a:latin typeface="Arial" panose="020B0604020202020204" pitchFamily="34" charset="0"/>
+                <a:cs typeface="Arial" panose="020B0604020202020204" pitchFamily="34" charset="0"/>
+              </a:rPr>
+              <a:t>house</a:t>
+            </a:r>
+            <a:r>
+              <a:rPr lang="de-DE" sz="2000" dirty="0">
+                <a:latin typeface="Arial" panose="020B0604020202020204" pitchFamily="34" charset="0"/>
+                <a:cs typeface="Arial" panose="020B0604020202020204" pitchFamily="34" charset="0"/>
+              </a:rPr>
+              <a:t>.</a:t>
+            </a:r>
+            <a:endParaRPr lang="en-DE" sz="2000" dirty="0">
+              <a:latin typeface="Arial" panose="020B0604020202020204" pitchFamily="34" charset="0"/>
+              <a:cs typeface="Arial" panose="020B0604020202020204" pitchFamily="34" charset="0"/>
+            </a:endParaRPr>
+          </a:p>
+        </p:txBody>
+      </p:sp>
+      <p:sp>
+        <p:nvSpPr>
+          <p:cNvPr id="6" name="TextBox 5">
+            <a:extLst>
+              <a:ext uri="{FF2B5EF4-FFF2-40B4-BE49-F238E27FC236}">
+                <a16:creationId xmlns:a16="http://schemas.microsoft.com/office/drawing/2014/main" id="{9076AF5F-6ABF-A983-FB61-4217FD425BB2}"/>
+              </a:ext>
+            </a:extLst>
+          </p:cNvPr>
+          <p:cNvSpPr txBox="1"/>
+          <p:nvPr/>
+        </p:nvSpPr>
+        <p:spPr>
+          <a:xfrm>
+            <a:off x="3022165" y="2402240"/>
+            <a:ext cx="853119" cy="323165"/>
+          </a:xfrm>
+          <a:prstGeom prst="rect">
+            <a:avLst/>
+          </a:prstGeom>
+          <a:noFill/>
+        </p:spPr>
+        <p:txBody>
+          <a:bodyPr wrap="none" rtlCol="0">
+            <a:spAutoFit/>
+          </a:bodyPr>
+          <a:lstStyle/>
+          <a:p>
+            <a:r>
+              <a:rPr lang="en-GB" sz="1500" dirty="0"/>
+              <a:t>r</a:t>
+            </a:r>
+            <a:r>
+              <a:rPr lang="en-DE" sz="1500" dirty="0"/>
+              <a:t> = </a:t>
+            </a:r>
+            <a:r>
+              <a:rPr lang="en-DE" sz="1500" b="0" i="0" dirty="0">
+                <a:effectLst/>
+                <a:latin typeface="Arial" panose="020B0604020202020204" pitchFamily="34" charset="0"/>
+                <a:cs typeface="Arial" panose="020B0604020202020204" pitchFamily="34" charset="0"/>
+              </a:rPr>
+              <a:t>0.15</a:t>
+            </a:r>
+            <a:r>
+              <a:rPr lang="en-DE" sz="1500" dirty="0"/>
+              <a:t> </a:t>
+            </a:r>
+          </a:p>
+        </p:txBody>
+      </p:sp>
       <p:grpSp>
         <p:nvGrpSpPr>
-          <p:cNvPr id="13" name="Group 12">
-            <a:extLst>
-              <a:ext uri="{FF2B5EF4-FFF2-40B4-BE49-F238E27FC236}">
-                <a16:creationId xmlns:a16="http://schemas.microsoft.com/office/drawing/2014/main" id="{6ED87326-ADA5-FE4C-BF95-598BDECF0B23}"/>
+          <p:cNvPr id="9" name="Group 8">
+            <a:extLst>
+              <a:ext uri="{FF2B5EF4-FFF2-40B4-BE49-F238E27FC236}">
+                <a16:creationId xmlns:a16="http://schemas.microsoft.com/office/drawing/2014/main" id="{4FC52F36-77D3-AE5C-4BC7-FD1580E812C7}"/>
               </a:ext>
             </a:extLst>
           </p:cNvPr>
@@ -6556,54 +6878,58 @@
             </a:p>
           </p:txBody>
         </p:sp>
+        <p:sp>
+          <p:nvSpPr>
+            <p:cNvPr id="7" name="TextBox 6">
+              <a:extLst>
+                <a:ext uri="{FF2B5EF4-FFF2-40B4-BE49-F238E27FC236}">
+                  <a16:creationId xmlns:a16="http://schemas.microsoft.com/office/drawing/2014/main" id="{67F6BAB9-A979-DBB1-377E-20AE4262CF3A}"/>
+                </a:ext>
+              </a:extLst>
+            </p:cNvPr>
+            <p:cNvSpPr txBox="1"/>
+            <p:nvPr/>
+          </p:nvSpPr>
+          <p:spPr>
+            <a:xfrm>
+              <a:off x="7328108" y="2399659"/>
+              <a:ext cx="853119" cy="323165"/>
+            </a:xfrm>
+            <a:prstGeom prst="rect">
+              <a:avLst/>
+            </a:prstGeom>
+            <a:noFill/>
+          </p:spPr>
+          <p:txBody>
+            <a:bodyPr wrap="none" rtlCol="0">
+              <a:spAutoFit/>
+            </a:bodyPr>
+            <a:lstStyle/>
+            <a:p>
+              <a:r>
+                <a:rPr lang="en-GB" sz="1500" dirty="0"/>
+                <a:t>r</a:t>
+              </a:r>
+              <a:r>
+                <a:rPr lang="en-DE" sz="1500" dirty="0"/>
+                <a:t> = </a:t>
+              </a:r>
+              <a:r>
+                <a:rPr lang="en-DE" sz="1500" b="0" i="0" dirty="0">
+                  <a:effectLst/>
+                  <a:latin typeface="Arial" panose="020B0604020202020204" pitchFamily="34" charset="0"/>
+                  <a:cs typeface="Arial" panose="020B0604020202020204" pitchFamily="34" charset="0"/>
+                </a:rPr>
+                <a:t>0.74</a:t>
+              </a:r>
+              <a:r>
+                <a:rPr lang="en-DE" sz="1500" dirty="0"/>
+                <a:t> </a:t>
+              </a:r>
+            </a:p>
+          </p:txBody>
+        </p:sp>
       </p:grpSp>
-      <p:sp>
-        <p:nvSpPr>
-          <p:cNvPr id="3" name="TextBox 2">
-            <a:extLst>
-              <a:ext uri="{FF2B5EF4-FFF2-40B4-BE49-F238E27FC236}">
-                <a16:creationId xmlns:a16="http://schemas.microsoft.com/office/drawing/2014/main" id="{BBD48567-0B95-F3CA-B335-036BDCBE98CA}"/>
-              </a:ext>
-            </a:extLst>
-          </p:cNvPr>
-          <p:cNvSpPr txBox="1"/>
-          <p:nvPr/>
-        </p:nvSpPr>
-        <p:spPr>
-          <a:xfrm>
-            <a:off x="972000" y="5667207"/>
-            <a:ext cx="7199234" cy="400110"/>
-          </a:xfrm>
-          <a:prstGeom prst="rect">
-            <a:avLst/>
-          </a:prstGeom>
-          <a:solidFill>
-            <a:schemeClr val="bg1">
-              <a:lumMod val="85000"/>
-            </a:schemeClr>
-          </a:solidFill>
-        </p:spPr>
-        <p:txBody>
-          <a:bodyPr wrap="square" rtlCol="0">
-            <a:spAutoFit/>
-          </a:bodyPr>
-          <a:lstStyle/>
-          <a:p>
-            <a:pPr algn="just"/>
-            <a:r>
-              <a:rPr lang="de-DE" sz="2000" dirty="0">
-                <a:latin typeface="Arial" panose="020B0604020202020204" pitchFamily="34" charset="0"/>
-                <a:cs typeface="Arial" panose="020B0604020202020204" pitchFamily="34" charset="0"/>
-              </a:rPr>
-              <a:t>Blank.</a:t>
-            </a:r>
-            <a:endParaRPr lang="en-DE" sz="2000" dirty="0">
-              <a:latin typeface="Arial" panose="020B0604020202020204" pitchFamily="34" charset="0"/>
-              <a:cs typeface="Arial" panose="020B0604020202020204" pitchFamily="34" charset="0"/>
-            </a:endParaRPr>
-          </a:p>
-        </p:txBody>
-      </p:sp>
     </p:spTree>
     <p:extLst>
       <p:ext uri="{BB962C8B-B14F-4D97-AF65-F5344CB8AC3E}">
@@ -6648,7 +6974,7 @@
                                           </p:stCondLst>
                                         </p:cTn>
                                         <p:tgtEl>
-                                          <p:spTgt spid="13"/>
+                                          <p:spTgt spid="9"/>
                                         </p:tgtEl>
                                         <p:attrNameLst>
                                           <p:attrName>style.visibility</p:attrName>
@@ -6776,7 +7102,7 @@
         <p:spPr>
           <a:xfrm>
             <a:off x="609599" y="609600"/>
-            <a:ext cx="6347713" cy="735724"/>
+            <a:ext cx="7561635" cy="735724"/>
           </a:xfrm>
         </p:spPr>
         <p:txBody>
@@ -6790,7 +7116,7 @@
                 <a:latin typeface="Arial" panose="020B0604020202020204" pitchFamily="34" charset="0"/>
                 <a:cs typeface="Arial" panose="020B0604020202020204" pitchFamily="34" charset="0"/>
               </a:rPr>
-              <a:t>Which factors influence the price?</a:t>
+              <a:t>Which factors are correlated with the price?</a:t>
             </a:r>
           </a:p>
         </p:txBody>
@@ -6892,12 +7218,355 @@
           </p:txBody>
         </p:sp>
       </p:grpSp>
+      <p:sp>
+        <p:nvSpPr>
+          <p:cNvPr id="13" name="TextBox 12">
+            <a:extLst>
+              <a:ext uri="{FF2B5EF4-FFF2-40B4-BE49-F238E27FC236}">
+                <a16:creationId xmlns:a16="http://schemas.microsoft.com/office/drawing/2014/main" id="{72290C27-594F-8A0D-4BB3-82D17A86CBF1}"/>
+              </a:ext>
+            </a:extLst>
+          </p:cNvPr>
+          <p:cNvSpPr txBox="1"/>
+          <p:nvPr/>
+        </p:nvSpPr>
+        <p:spPr>
+          <a:xfrm>
+            <a:off x="972000" y="5667207"/>
+            <a:ext cx="7199234" cy="707886"/>
+          </a:xfrm>
+          <a:prstGeom prst="rect">
+            <a:avLst/>
+          </a:prstGeom>
+          <a:solidFill>
+            <a:schemeClr val="bg1">
+              <a:lumMod val="85000"/>
+            </a:schemeClr>
+          </a:solidFill>
+        </p:spPr>
+        <p:txBody>
+          <a:bodyPr wrap="square" rtlCol="0">
+            <a:spAutoFit/>
+          </a:bodyPr>
+          <a:lstStyle/>
+          <a:p>
+            <a:pPr algn="just"/>
+            <a:r>
+              <a:rPr lang="de-DE" sz="2000" dirty="0" err="1">
+                <a:latin typeface="Arial" panose="020B0604020202020204" pitchFamily="34" charset="0"/>
+                <a:cs typeface="Arial" panose="020B0604020202020204" pitchFamily="34" charset="0"/>
+              </a:rPr>
+              <a:t>Neither</a:t>
+            </a:r>
+            <a:r>
+              <a:rPr lang="de-DE" sz="2000" dirty="0">
+                <a:latin typeface="Arial" panose="020B0604020202020204" pitchFamily="34" charset="0"/>
+                <a:cs typeface="Arial" panose="020B0604020202020204" pitchFamily="34" charset="0"/>
+              </a:rPr>
+              <a:t> </a:t>
+            </a:r>
+            <a:r>
+              <a:rPr lang="de-DE" sz="2000" dirty="0" err="1">
+                <a:latin typeface="Arial" panose="020B0604020202020204" pitchFamily="34" charset="0"/>
+                <a:cs typeface="Arial" panose="020B0604020202020204" pitchFamily="34" charset="0"/>
+              </a:rPr>
+              <a:t>the</a:t>
+            </a:r>
+            <a:r>
+              <a:rPr lang="de-DE" sz="2000" dirty="0">
+                <a:latin typeface="Arial" panose="020B0604020202020204" pitchFamily="34" charset="0"/>
+                <a:cs typeface="Arial" panose="020B0604020202020204" pitchFamily="34" charset="0"/>
+              </a:rPr>
+              <a:t> </a:t>
+            </a:r>
+            <a:r>
+              <a:rPr lang="de-DE" sz="2000" dirty="0" err="1">
+                <a:latin typeface="Arial" panose="020B0604020202020204" pitchFamily="34" charset="0"/>
+                <a:cs typeface="Arial" panose="020B0604020202020204" pitchFamily="34" charset="0"/>
+              </a:rPr>
+              <a:t>era</a:t>
+            </a:r>
+            <a:r>
+              <a:rPr lang="de-DE" sz="2000" dirty="0">
+                <a:latin typeface="Arial" panose="020B0604020202020204" pitchFamily="34" charset="0"/>
+                <a:cs typeface="Arial" panose="020B0604020202020204" pitchFamily="34" charset="0"/>
+              </a:rPr>
+              <a:t> a </a:t>
+            </a:r>
+            <a:r>
+              <a:rPr lang="de-DE" sz="2000" dirty="0" err="1">
+                <a:latin typeface="Arial" panose="020B0604020202020204" pitchFamily="34" charset="0"/>
+                <a:cs typeface="Arial" panose="020B0604020202020204" pitchFamily="34" charset="0"/>
+              </a:rPr>
+              <a:t>house</a:t>
+            </a:r>
+            <a:r>
+              <a:rPr lang="de-DE" sz="2000" dirty="0">
+                <a:latin typeface="Arial" panose="020B0604020202020204" pitchFamily="34" charset="0"/>
+                <a:cs typeface="Arial" panose="020B0604020202020204" pitchFamily="34" charset="0"/>
+              </a:rPr>
+              <a:t> was </a:t>
+            </a:r>
+            <a:r>
+              <a:rPr lang="de-DE" sz="2000" dirty="0" err="1">
+                <a:latin typeface="Arial" panose="020B0604020202020204" pitchFamily="34" charset="0"/>
+                <a:cs typeface="Arial" panose="020B0604020202020204" pitchFamily="34" charset="0"/>
+              </a:rPr>
+              <a:t>build</a:t>
+            </a:r>
+            <a:r>
+              <a:rPr lang="de-DE" sz="2000" dirty="0">
+                <a:latin typeface="Arial" panose="020B0604020202020204" pitchFamily="34" charset="0"/>
+                <a:cs typeface="Arial" panose="020B0604020202020204" pitchFamily="34" charset="0"/>
+              </a:rPr>
+              <a:t> </a:t>
+            </a:r>
+            <a:r>
+              <a:rPr lang="de-DE" sz="2000" dirty="0" err="1">
+                <a:latin typeface="Arial" panose="020B0604020202020204" pitchFamily="34" charset="0"/>
+                <a:cs typeface="Arial" panose="020B0604020202020204" pitchFamily="34" charset="0"/>
+              </a:rPr>
+              <a:t>nor</a:t>
+            </a:r>
+            <a:r>
+              <a:rPr lang="de-DE" sz="2000" dirty="0">
+                <a:latin typeface="Arial" panose="020B0604020202020204" pitchFamily="34" charset="0"/>
+                <a:cs typeface="Arial" panose="020B0604020202020204" pitchFamily="34" charset="0"/>
+              </a:rPr>
+              <a:t> </a:t>
+            </a:r>
+            <a:r>
+              <a:rPr lang="de-DE" sz="2000" dirty="0" err="1">
+                <a:latin typeface="Arial" panose="020B0604020202020204" pitchFamily="34" charset="0"/>
+                <a:cs typeface="Arial" panose="020B0604020202020204" pitchFamily="34" charset="0"/>
+              </a:rPr>
+              <a:t>the</a:t>
+            </a:r>
+            <a:r>
+              <a:rPr lang="de-DE" sz="2000" dirty="0">
+                <a:latin typeface="Arial" panose="020B0604020202020204" pitchFamily="34" charset="0"/>
+                <a:cs typeface="Arial" panose="020B0604020202020204" pitchFamily="34" charset="0"/>
+              </a:rPr>
+              <a:t> </a:t>
+            </a:r>
+            <a:r>
+              <a:rPr lang="de-DE" sz="2000" dirty="0" err="1">
+                <a:latin typeface="Arial" panose="020B0604020202020204" pitchFamily="34" charset="0"/>
+                <a:cs typeface="Arial" panose="020B0604020202020204" pitchFamily="34" charset="0"/>
+              </a:rPr>
+              <a:t>renovation</a:t>
+            </a:r>
+            <a:r>
+              <a:rPr lang="de-DE" sz="2000" dirty="0">
+                <a:latin typeface="Arial" panose="020B0604020202020204" pitchFamily="34" charset="0"/>
+                <a:cs typeface="Arial" panose="020B0604020202020204" pitchFamily="34" charset="0"/>
+              </a:rPr>
+              <a:t> </a:t>
+            </a:r>
+            <a:r>
+              <a:rPr lang="de-DE" sz="2000" dirty="0" err="1">
+                <a:latin typeface="Arial" panose="020B0604020202020204" pitchFamily="34" charset="0"/>
+                <a:cs typeface="Arial" panose="020B0604020202020204" pitchFamily="34" charset="0"/>
+              </a:rPr>
+              <a:t>seems</a:t>
+            </a:r>
+            <a:r>
+              <a:rPr lang="de-DE" sz="2000" dirty="0">
+                <a:latin typeface="Arial" panose="020B0604020202020204" pitchFamily="34" charset="0"/>
+                <a:cs typeface="Arial" panose="020B0604020202020204" pitchFamily="34" charset="0"/>
+              </a:rPr>
+              <a:t> </a:t>
+            </a:r>
+            <a:r>
+              <a:rPr lang="de-DE" sz="2000" dirty="0" err="1">
+                <a:latin typeface="Arial" panose="020B0604020202020204" pitchFamily="34" charset="0"/>
+                <a:cs typeface="Arial" panose="020B0604020202020204" pitchFamily="34" charset="0"/>
+              </a:rPr>
+              <a:t>to</a:t>
+            </a:r>
+            <a:r>
+              <a:rPr lang="de-DE" sz="2000" dirty="0">
+                <a:latin typeface="Arial" panose="020B0604020202020204" pitchFamily="34" charset="0"/>
+                <a:cs typeface="Arial" panose="020B0604020202020204" pitchFamily="34" charset="0"/>
+              </a:rPr>
+              <a:t> </a:t>
+            </a:r>
+            <a:r>
+              <a:rPr lang="de-DE" sz="2000" dirty="0" err="1">
+                <a:latin typeface="Arial" panose="020B0604020202020204" pitchFamily="34" charset="0"/>
+                <a:cs typeface="Arial" panose="020B0604020202020204" pitchFamily="34" charset="0"/>
+              </a:rPr>
+              <a:t>be</a:t>
+            </a:r>
+            <a:r>
+              <a:rPr lang="de-DE" sz="2000" dirty="0">
+                <a:latin typeface="Arial" panose="020B0604020202020204" pitchFamily="34" charset="0"/>
+                <a:cs typeface="Arial" panose="020B0604020202020204" pitchFamily="34" charset="0"/>
+              </a:rPr>
+              <a:t> </a:t>
+            </a:r>
+            <a:r>
+              <a:rPr lang="de-DE" sz="2000" dirty="0" err="1">
+                <a:latin typeface="Arial" panose="020B0604020202020204" pitchFamily="34" charset="0"/>
+                <a:cs typeface="Arial" panose="020B0604020202020204" pitchFamily="34" charset="0"/>
+              </a:rPr>
+              <a:t>correlated</a:t>
+            </a:r>
+            <a:r>
+              <a:rPr lang="de-DE" sz="2000" dirty="0">
+                <a:latin typeface="Arial" panose="020B0604020202020204" pitchFamily="34" charset="0"/>
+                <a:cs typeface="Arial" panose="020B0604020202020204" pitchFamily="34" charset="0"/>
+              </a:rPr>
+              <a:t> </a:t>
+            </a:r>
+            <a:r>
+              <a:rPr lang="de-DE" sz="2000" dirty="0" err="1">
+                <a:latin typeface="Arial" panose="020B0604020202020204" pitchFamily="34" charset="0"/>
+                <a:cs typeface="Arial" panose="020B0604020202020204" pitchFamily="34" charset="0"/>
+              </a:rPr>
+              <a:t>with</a:t>
+            </a:r>
+            <a:r>
+              <a:rPr lang="de-DE" sz="2000" dirty="0">
+                <a:latin typeface="Arial" panose="020B0604020202020204" pitchFamily="34" charset="0"/>
+                <a:cs typeface="Arial" panose="020B0604020202020204" pitchFamily="34" charset="0"/>
+              </a:rPr>
+              <a:t> </a:t>
+            </a:r>
+            <a:r>
+              <a:rPr lang="de-DE" sz="2000" dirty="0" err="1">
+                <a:latin typeface="Arial" panose="020B0604020202020204" pitchFamily="34" charset="0"/>
+                <a:cs typeface="Arial" panose="020B0604020202020204" pitchFamily="34" charset="0"/>
+              </a:rPr>
+              <a:t>the</a:t>
+            </a:r>
+            <a:r>
+              <a:rPr lang="de-DE" sz="2000" dirty="0">
+                <a:latin typeface="Arial" panose="020B0604020202020204" pitchFamily="34" charset="0"/>
+                <a:cs typeface="Arial" panose="020B0604020202020204" pitchFamily="34" charset="0"/>
+              </a:rPr>
+              <a:t> </a:t>
+            </a:r>
+            <a:r>
+              <a:rPr lang="de-DE" sz="2000" dirty="0" err="1">
+                <a:latin typeface="Arial" panose="020B0604020202020204" pitchFamily="34" charset="0"/>
+                <a:cs typeface="Arial" panose="020B0604020202020204" pitchFamily="34" charset="0"/>
+              </a:rPr>
+              <a:t>price</a:t>
+            </a:r>
+            <a:r>
+              <a:rPr lang="de-DE" sz="2000" dirty="0">
+                <a:latin typeface="Arial" panose="020B0604020202020204" pitchFamily="34" charset="0"/>
+                <a:cs typeface="Arial" panose="020B0604020202020204" pitchFamily="34" charset="0"/>
+              </a:rPr>
+              <a:t> </a:t>
+            </a:r>
+            <a:r>
+              <a:rPr lang="de-DE" sz="2000" dirty="0" err="1">
+                <a:latin typeface="Arial" panose="020B0604020202020204" pitchFamily="34" charset="0"/>
+                <a:cs typeface="Arial" panose="020B0604020202020204" pitchFamily="34" charset="0"/>
+              </a:rPr>
+              <a:t>of</a:t>
+            </a:r>
+            <a:r>
+              <a:rPr lang="de-DE" sz="2000" dirty="0">
+                <a:latin typeface="Arial" panose="020B0604020202020204" pitchFamily="34" charset="0"/>
+                <a:cs typeface="Arial" panose="020B0604020202020204" pitchFamily="34" charset="0"/>
+              </a:rPr>
+              <a:t> a </a:t>
+            </a:r>
+            <a:r>
+              <a:rPr lang="de-DE" sz="2000" dirty="0" err="1">
+                <a:latin typeface="Arial" panose="020B0604020202020204" pitchFamily="34" charset="0"/>
+                <a:cs typeface="Arial" panose="020B0604020202020204" pitchFamily="34" charset="0"/>
+              </a:rPr>
+              <a:t>historic</a:t>
+            </a:r>
+            <a:r>
+              <a:rPr lang="de-DE" sz="2000" dirty="0">
+                <a:latin typeface="Arial" panose="020B0604020202020204" pitchFamily="34" charset="0"/>
+                <a:cs typeface="Arial" panose="020B0604020202020204" pitchFamily="34" charset="0"/>
+              </a:rPr>
+              <a:t> </a:t>
+            </a:r>
+            <a:r>
+              <a:rPr lang="de-DE" sz="2000" dirty="0" err="1">
+                <a:latin typeface="Arial" panose="020B0604020202020204" pitchFamily="34" charset="0"/>
+                <a:cs typeface="Arial" panose="020B0604020202020204" pitchFamily="34" charset="0"/>
+              </a:rPr>
+              <a:t>house</a:t>
+            </a:r>
+            <a:r>
+              <a:rPr lang="de-DE" sz="2000" dirty="0">
+                <a:latin typeface="Arial" panose="020B0604020202020204" pitchFamily="34" charset="0"/>
+                <a:cs typeface="Arial" panose="020B0604020202020204" pitchFamily="34" charset="0"/>
+              </a:rPr>
+              <a:t>. </a:t>
+            </a:r>
+            <a:endParaRPr lang="en-DE" sz="2000" dirty="0">
+              <a:latin typeface="Arial" panose="020B0604020202020204" pitchFamily="34" charset="0"/>
+              <a:cs typeface="Arial" panose="020B0604020202020204" pitchFamily="34" charset="0"/>
+            </a:endParaRPr>
+          </a:p>
+        </p:txBody>
+      </p:sp>
+      <p:sp>
+        <p:nvSpPr>
+          <p:cNvPr id="4" name="TextBox 3">
+            <a:extLst>
+              <a:ext uri="{FF2B5EF4-FFF2-40B4-BE49-F238E27FC236}">
+                <a16:creationId xmlns:a16="http://schemas.microsoft.com/office/drawing/2014/main" id="{BB3CE697-3549-00F5-A758-38A177372773}"/>
+              </a:ext>
+            </a:extLst>
+          </p:cNvPr>
+          <p:cNvSpPr txBox="1"/>
+          <p:nvPr/>
+        </p:nvSpPr>
+        <p:spPr>
+          <a:xfrm>
+            <a:off x="3022165" y="2402240"/>
+            <a:ext cx="912429" cy="323165"/>
+          </a:xfrm>
+          <a:prstGeom prst="rect">
+            <a:avLst/>
+          </a:prstGeom>
+          <a:noFill/>
+        </p:spPr>
+        <p:txBody>
+          <a:bodyPr wrap="none" rtlCol="0">
+            <a:spAutoFit/>
+          </a:bodyPr>
+          <a:lstStyle/>
+          <a:p>
+            <a:r>
+              <a:rPr lang="en-GB" sz="1500" dirty="0"/>
+              <a:t>r</a:t>
+            </a:r>
+            <a:r>
+              <a:rPr lang="en-DE" sz="1500" dirty="0"/>
+              <a:t> = -</a:t>
+            </a:r>
+            <a:r>
+              <a:rPr lang="en-DE" sz="1500" b="0" i="0" dirty="0">
+                <a:effectLst/>
+                <a:latin typeface="Arial" panose="020B0604020202020204" pitchFamily="34" charset="0"/>
+                <a:cs typeface="Arial" panose="020B0604020202020204" pitchFamily="34" charset="0"/>
+              </a:rPr>
+              <a:t>0.17</a:t>
+            </a:r>
+            <a:r>
+              <a:rPr lang="en-DE" sz="1500" dirty="0"/>
+              <a:t> </a:t>
+            </a:r>
+          </a:p>
+        </p:txBody>
+      </p:sp>
       <p:grpSp>
         <p:nvGrpSpPr>
-          <p:cNvPr id="15" name="Group 14">
-            <a:extLst>
-              <a:ext uri="{FF2B5EF4-FFF2-40B4-BE49-F238E27FC236}">
-                <a16:creationId xmlns:a16="http://schemas.microsoft.com/office/drawing/2014/main" id="{A0CF89E8-BD3B-E835-2CFE-E5AF027132F0}"/>
+          <p:cNvPr id="8" name="Group 7">
+            <a:extLst>
+              <a:ext uri="{FF2B5EF4-FFF2-40B4-BE49-F238E27FC236}">
+                <a16:creationId xmlns:a16="http://schemas.microsoft.com/office/drawing/2014/main" id="{E9147EA1-7F92-B48C-EE68-F285344BCBAB}"/>
               </a:ext>
             </a:extLst>
           </p:cNvPr>
@@ -6988,54 +7657,58 @@
             </a:p>
           </p:txBody>
         </p:sp>
+        <p:sp>
+          <p:nvSpPr>
+            <p:cNvPr id="5" name="TextBox 4">
+              <a:extLst>
+                <a:ext uri="{FF2B5EF4-FFF2-40B4-BE49-F238E27FC236}">
+                  <a16:creationId xmlns:a16="http://schemas.microsoft.com/office/drawing/2014/main" id="{092394C0-8404-02E2-D619-452D808C9315}"/>
+                </a:ext>
+              </a:extLst>
+            </p:cNvPr>
+            <p:cNvSpPr txBox="1"/>
+            <p:nvPr/>
+          </p:nvSpPr>
+          <p:spPr>
+            <a:xfrm>
+              <a:off x="7328108" y="2399659"/>
+              <a:ext cx="853119" cy="323165"/>
+            </a:xfrm>
+            <a:prstGeom prst="rect">
+              <a:avLst/>
+            </a:prstGeom>
+            <a:noFill/>
+          </p:spPr>
+          <p:txBody>
+            <a:bodyPr wrap="none" rtlCol="0">
+              <a:spAutoFit/>
+            </a:bodyPr>
+            <a:lstStyle/>
+            <a:p>
+              <a:r>
+                <a:rPr lang="en-GB" sz="1500" dirty="0"/>
+                <a:t>r</a:t>
+              </a:r>
+              <a:r>
+                <a:rPr lang="en-DE" sz="1500" dirty="0"/>
+                <a:t> = </a:t>
+              </a:r>
+              <a:r>
+                <a:rPr lang="en-DE" sz="1500" b="0" i="0" dirty="0">
+                  <a:effectLst/>
+                  <a:latin typeface="Arial" panose="020B0604020202020204" pitchFamily="34" charset="0"/>
+                  <a:cs typeface="Arial" panose="020B0604020202020204" pitchFamily="34" charset="0"/>
+                </a:rPr>
+                <a:t>0.01</a:t>
+              </a:r>
+              <a:r>
+                <a:rPr lang="en-DE" sz="1500" dirty="0"/>
+                <a:t> </a:t>
+              </a:r>
+            </a:p>
+          </p:txBody>
+        </p:sp>
       </p:grpSp>
-      <p:sp>
-        <p:nvSpPr>
-          <p:cNvPr id="13" name="TextBox 12">
-            <a:extLst>
-              <a:ext uri="{FF2B5EF4-FFF2-40B4-BE49-F238E27FC236}">
-                <a16:creationId xmlns:a16="http://schemas.microsoft.com/office/drawing/2014/main" id="{72290C27-594F-8A0D-4BB3-82D17A86CBF1}"/>
-              </a:ext>
-            </a:extLst>
-          </p:cNvPr>
-          <p:cNvSpPr txBox="1"/>
-          <p:nvPr/>
-        </p:nvSpPr>
-        <p:spPr>
-          <a:xfrm>
-            <a:off x="972000" y="5667207"/>
-            <a:ext cx="7199234" cy="400110"/>
-          </a:xfrm>
-          <a:prstGeom prst="rect">
-            <a:avLst/>
-          </a:prstGeom>
-          <a:solidFill>
-            <a:schemeClr val="bg1">
-              <a:lumMod val="85000"/>
-            </a:schemeClr>
-          </a:solidFill>
-        </p:spPr>
-        <p:txBody>
-          <a:bodyPr wrap="square" rtlCol="0">
-            <a:spAutoFit/>
-          </a:bodyPr>
-          <a:lstStyle/>
-          <a:p>
-            <a:pPr algn="just"/>
-            <a:r>
-              <a:rPr lang="de-DE" sz="2000" dirty="0">
-                <a:latin typeface="Arial" panose="020B0604020202020204" pitchFamily="34" charset="0"/>
-                <a:cs typeface="Arial" panose="020B0604020202020204" pitchFamily="34" charset="0"/>
-              </a:rPr>
-              <a:t>Blank.</a:t>
-            </a:r>
-            <a:endParaRPr lang="en-DE" sz="2000" dirty="0">
-              <a:latin typeface="Arial" panose="020B0604020202020204" pitchFamily="34" charset="0"/>
-              <a:cs typeface="Arial" panose="020B0604020202020204" pitchFamily="34" charset="0"/>
-            </a:endParaRPr>
-          </a:p>
-        </p:txBody>
-      </p:sp>
     </p:spTree>
     <p:extLst>
       <p:ext uri="{BB962C8B-B14F-4D97-AF65-F5344CB8AC3E}">
@@ -7080,7 +7753,7 @@
                                           </p:stCondLst>
                                         </p:cTn>
                                         <p:tgtEl>
-                                          <p:spTgt spid="15"/>
+                                          <p:spTgt spid="8"/>
                                         </p:tgtEl>
                                         <p:attrNameLst>
                                           <p:attrName>style.visibility</p:attrName>
@@ -7208,7 +7881,7 @@
         <p:spPr>
           <a:xfrm>
             <a:off x="609599" y="609600"/>
-            <a:ext cx="6347713" cy="735724"/>
+            <a:ext cx="7561635" cy="735724"/>
           </a:xfrm>
         </p:spPr>
         <p:txBody>
@@ -7222,7 +7895,7 @@
                 <a:latin typeface="Arial" panose="020B0604020202020204" pitchFamily="34" charset="0"/>
                 <a:cs typeface="Arial" panose="020B0604020202020204" pitchFamily="34" charset="0"/>
               </a:rPr>
-              <a:t>Which factors influence the price?</a:t>
+              <a:t>Which factors are correlated with the price?</a:t>
             </a:r>
           </a:p>
         </p:txBody>
@@ -7567,7 +8240,7 @@
         <p:spPr>
           <a:xfrm>
             <a:off x="972000" y="5667207"/>
-            <a:ext cx="7199234" cy="400110"/>
+            <a:ext cx="7199234" cy="707886"/>
           </a:xfrm>
           <a:prstGeom prst="rect">
             <a:avLst/>
@@ -7586,11 +8259,284 @@
           <a:p>
             <a:pPr algn="just"/>
             <a:r>
+              <a:rPr lang="de-DE" sz="2000" dirty="0" err="1">
+                <a:latin typeface="Arial" panose="020B0604020202020204" pitchFamily="34" charset="0"/>
+                <a:cs typeface="Arial" panose="020B0604020202020204" pitchFamily="34" charset="0"/>
+              </a:rPr>
+              <a:t>From</a:t>
+            </a:r>
+            <a:r>
               <a:rPr lang="de-DE" sz="2000" dirty="0">
                 <a:latin typeface="Arial" panose="020B0604020202020204" pitchFamily="34" charset="0"/>
                 <a:cs typeface="Arial" panose="020B0604020202020204" pitchFamily="34" charset="0"/>
               </a:rPr>
-              <a:t>Blank.</a:t>
+              <a:t> </a:t>
+            </a:r>
+            <a:r>
+              <a:rPr lang="de-DE" sz="2000" dirty="0" err="1">
+                <a:latin typeface="Arial" panose="020B0604020202020204" pitchFamily="34" charset="0"/>
+                <a:cs typeface="Arial" panose="020B0604020202020204" pitchFamily="34" charset="0"/>
+              </a:rPr>
+              <a:t>the</a:t>
+            </a:r>
+            <a:r>
+              <a:rPr lang="de-DE" sz="2000" dirty="0">
+                <a:latin typeface="Arial" panose="020B0604020202020204" pitchFamily="34" charset="0"/>
+                <a:cs typeface="Arial" panose="020B0604020202020204" pitchFamily="34" charset="0"/>
+              </a:rPr>
+              <a:t> </a:t>
+            </a:r>
+            <a:r>
+              <a:rPr lang="de-DE" sz="2000" dirty="0" err="1">
+                <a:latin typeface="Arial" panose="020B0604020202020204" pitchFamily="34" charset="0"/>
+                <a:cs typeface="Arial" panose="020B0604020202020204" pitchFamily="34" charset="0"/>
+              </a:rPr>
+              <a:t>four</a:t>
+            </a:r>
+            <a:r>
+              <a:rPr lang="de-DE" sz="2000" dirty="0">
+                <a:latin typeface="Arial" panose="020B0604020202020204" pitchFamily="34" charset="0"/>
+                <a:cs typeface="Arial" panose="020B0604020202020204" pitchFamily="34" charset="0"/>
+              </a:rPr>
+              <a:t> </a:t>
+            </a:r>
+            <a:r>
+              <a:rPr lang="de-DE" sz="2000" dirty="0" err="1">
+                <a:latin typeface="Arial" panose="020B0604020202020204" pitchFamily="34" charset="0"/>
+                <a:cs typeface="Arial" panose="020B0604020202020204" pitchFamily="34" charset="0"/>
+              </a:rPr>
+              <a:t>factors</a:t>
+            </a:r>
+            <a:r>
+              <a:rPr lang="de-DE" sz="2000" dirty="0">
+                <a:latin typeface="Arial" panose="020B0604020202020204" pitchFamily="34" charset="0"/>
+                <a:cs typeface="Arial" panose="020B0604020202020204" pitchFamily="34" charset="0"/>
+              </a:rPr>
+              <a:t> </a:t>
+            </a:r>
+            <a:r>
+              <a:rPr lang="de-DE" sz="2000" dirty="0" err="1">
+                <a:latin typeface="Arial" panose="020B0604020202020204" pitchFamily="34" charset="0"/>
+                <a:cs typeface="Arial" panose="020B0604020202020204" pitchFamily="34" charset="0"/>
+              </a:rPr>
+              <a:t>we</a:t>
+            </a:r>
+            <a:r>
+              <a:rPr lang="de-DE" sz="2000" dirty="0">
+                <a:latin typeface="Arial" panose="020B0604020202020204" pitchFamily="34" charset="0"/>
+                <a:cs typeface="Arial" panose="020B0604020202020204" pitchFamily="34" charset="0"/>
+              </a:rPr>
+              <a:t> </a:t>
+            </a:r>
+            <a:r>
+              <a:rPr lang="de-DE" sz="2000" dirty="0" err="1">
+                <a:latin typeface="Arial" panose="020B0604020202020204" pitchFamily="34" charset="0"/>
+                <a:cs typeface="Arial" panose="020B0604020202020204" pitchFamily="34" charset="0"/>
+              </a:rPr>
+              <a:t>analysed</a:t>
+            </a:r>
+            <a:r>
+              <a:rPr lang="de-DE" sz="2000" dirty="0">
+                <a:latin typeface="Arial" panose="020B0604020202020204" pitchFamily="34" charset="0"/>
+                <a:cs typeface="Arial" panose="020B0604020202020204" pitchFamily="34" charset="0"/>
+              </a:rPr>
+              <a:t> </a:t>
+            </a:r>
+            <a:r>
+              <a:rPr lang="de-DE" sz="2000" b="1" dirty="0" err="1">
+                <a:latin typeface="Arial" panose="020B0604020202020204" pitchFamily="34" charset="0"/>
+                <a:cs typeface="Arial" panose="020B0604020202020204" pitchFamily="34" charset="0"/>
+              </a:rPr>
+              <a:t>only</a:t>
+            </a:r>
+            <a:r>
+              <a:rPr lang="de-DE" sz="2000" b="1" dirty="0">
+                <a:latin typeface="Arial" panose="020B0604020202020204" pitchFamily="34" charset="0"/>
+                <a:cs typeface="Arial" panose="020B0604020202020204" pitchFamily="34" charset="0"/>
+              </a:rPr>
+              <a:t> </a:t>
+            </a:r>
+            <a:r>
+              <a:rPr lang="de-DE" sz="2000" b="1" dirty="0" err="1">
+                <a:latin typeface="Arial" panose="020B0604020202020204" pitchFamily="34" charset="0"/>
+                <a:cs typeface="Arial" panose="020B0604020202020204" pitchFamily="34" charset="0"/>
+              </a:rPr>
+              <a:t>the</a:t>
+            </a:r>
+            <a:r>
+              <a:rPr lang="de-DE" sz="2000" b="1" dirty="0">
+                <a:latin typeface="Arial" panose="020B0604020202020204" pitchFamily="34" charset="0"/>
+                <a:cs typeface="Arial" panose="020B0604020202020204" pitchFamily="34" charset="0"/>
+              </a:rPr>
+              <a:t> grade </a:t>
+            </a:r>
+            <a:r>
+              <a:rPr lang="de-DE" sz="2000" b="1" dirty="0" err="1">
+                <a:latin typeface="Arial" panose="020B0604020202020204" pitchFamily="34" charset="0"/>
+                <a:cs typeface="Arial" panose="020B0604020202020204" pitchFamily="34" charset="0"/>
+              </a:rPr>
+              <a:t>of</a:t>
+            </a:r>
+            <a:r>
+              <a:rPr lang="de-DE" sz="2000" b="1" dirty="0">
+                <a:latin typeface="Arial" panose="020B0604020202020204" pitchFamily="34" charset="0"/>
+                <a:cs typeface="Arial" panose="020B0604020202020204" pitchFamily="34" charset="0"/>
+              </a:rPr>
+              <a:t> a </a:t>
+            </a:r>
+            <a:r>
+              <a:rPr lang="de-DE" sz="2000" b="1" dirty="0" err="1">
+                <a:latin typeface="Arial" panose="020B0604020202020204" pitchFamily="34" charset="0"/>
+                <a:cs typeface="Arial" panose="020B0604020202020204" pitchFamily="34" charset="0"/>
+              </a:rPr>
+              <a:t>house</a:t>
+            </a:r>
+            <a:r>
+              <a:rPr lang="de-DE" sz="2000" b="1" dirty="0">
+                <a:latin typeface="Arial" panose="020B0604020202020204" pitchFamily="34" charset="0"/>
+                <a:cs typeface="Arial" panose="020B0604020202020204" pitchFamily="34" charset="0"/>
+              </a:rPr>
+              <a:t> </a:t>
+            </a:r>
+            <a:r>
+              <a:rPr lang="de-DE" sz="2000" dirty="0" err="1">
+                <a:latin typeface="Arial" panose="020B0604020202020204" pitchFamily="34" charset="0"/>
+                <a:cs typeface="Arial" panose="020B0604020202020204" pitchFamily="34" charset="0"/>
+              </a:rPr>
+              <a:t>seems</a:t>
+            </a:r>
+            <a:r>
+              <a:rPr lang="de-DE" sz="2000" dirty="0">
+                <a:latin typeface="Arial" panose="020B0604020202020204" pitchFamily="34" charset="0"/>
+                <a:cs typeface="Arial" panose="020B0604020202020204" pitchFamily="34" charset="0"/>
+              </a:rPr>
+              <a:t> </a:t>
+            </a:r>
+            <a:r>
+              <a:rPr lang="de-DE" sz="2000" dirty="0" err="1">
+                <a:latin typeface="Arial" panose="020B0604020202020204" pitchFamily="34" charset="0"/>
+                <a:cs typeface="Arial" panose="020B0604020202020204" pitchFamily="34" charset="0"/>
+              </a:rPr>
+              <a:t>to</a:t>
+            </a:r>
+            <a:r>
+              <a:rPr lang="de-DE" sz="2000" dirty="0">
+                <a:latin typeface="Arial" panose="020B0604020202020204" pitchFamily="34" charset="0"/>
+                <a:cs typeface="Arial" panose="020B0604020202020204" pitchFamily="34" charset="0"/>
+              </a:rPr>
+              <a:t> </a:t>
+            </a:r>
+            <a:r>
+              <a:rPr lang="de-DE" sz="2000" dirty="0" err="1">
+                <a:latin typeface="Arial" panose="020B0604020202020204" pitchFamily="34" charset="0"/>
+                <a:cs typeface="Arial" panose="020B0604020202020204" pitchFamily="34" charset="0"/>
+              </a:rPr>
+              <a:t>be</a:t>
+            </a:r>
+            <a:r>
+              <a:rPr lang="de-DE" sz="2000" dirty="0">
+                <a:latin typeface="Arial" panose="020B0604020202020204" pitchFamily="34" charset="0"/>
+                <a:cs typeface="Arial" panose="020B0604020202020204" pitchFamily="34" charset="0"/>
+              </a:rPr>
+              <a:t> </a:t>
+            </a:r>
+            <a:r>
+              <a:rPr lang="de-DE" sz="2000" b="1" dirty="0" err="1">
+                <a:latin typeface="Arial" panose="020B0604020202020204" pitchFamily="34" charset="0"/>
+                <a:cs typeface="Arial" panose="020B0604020202020204" pitchFamily="34" charset="0"/>
+              </a:rPr>
+              <a:t>correlated</a:t>
+            </a:r>
+            <a:r>
+              <a:rPr lang="de-DE" sz="2000" dirty="0">
+                <a:latin typeface="Arial" panose="020B0604020202020204" pitchFamily="34" charset="0"/>
+                <a:cs typeface="Arial" panose="020B0604020202020204" pitchFamily="34" charset="0"/>
+              </a:rPr>
+              <a:t> </a:t>
+            </a:r>
+            <a:r>
+              <a:rPr lang="de-DE" sz="2000" b="1" dirty="0" err="1">
+                <a:latin typeface="Arial" panose="020B0604020202020204" pitchFamily="34" charset="0"/>
+                <a:cs typeface="Arial" panose="020B0604020202020204" pitchFamily="34" charset="0"/>
+              </a:rPr>
+              <a:t>with</a:t>
+            </a:r>
+            <a:r>
+              <a:rPr lang="de-DE" sz="2000" dirty="0">
+                <a:latin typeface="Arial" panose="020B0604020202020204" pitchFamily="34" charset="0"/>
+                <a:cs typeface="Arial" panose="020B0604020202020204" pitchFamily="34" charset="0"/>
+              </a:rPr>
+              <a:t> </a:t>
+            </a:r>
+            <a:r>
+              <a:rPr lang="de-DE" sz="2000" b="1" dirty="0" err="1">
+                <a:latin typeface="Arial" panose="020B0604020202020204" pitchFamily="34" charset="0"/>
+                <a:cs typeface="Arial" panose="020B0604020202020204" pitchFamily="34" charset="0"/>
+              </a:rPr>
+              <a:t>the</a:t>
+            </a:r>
+            <a:r>
+              <a:rPr lang="de-DE" sz="2000" dirty="0">
+                <a:latin typeface="Arial" panose="020B0604020202020204" pitchFamily="34" charset="0"/>
+                <a:cs typeface="Arial" panose="020B0604020202020204" pitchFamily="34" charset="0"/>
+              </a:rPr>
+              <a:t> </a:t>
+            </a:r>
+            <a:r>
+              <a:rPr lang="de-DE" sz="2000" b="1" dirty="0" err="1">
+                <a:latin typeface="Arial" panose="020B0604020202020204" pitchFamily="34" charset="0"/>
+                <a:cs typeface="Arial" panose="020B0604020202020204" pitchFamily="34" charset="0"/>
+              </a:rPr>
+              <a:t>price</a:t>
+            </a:r>
+            <a:r>
+              <a:rPr lang="de-DE" sz="2000" dirty="0">
+                <a:latin typeface="Arial" panose="020B0604020202020204" pitchFamily="34" charset="0"/>
+                <a:cs typeface="Arial" panose="020B0604020202020204" pitchFamily="34" charset="0"/>
+              </a:rPr>
+              <a:t> </a:t>
+            </a:r>
+            <a:r>
+              <a:rPr lang="de-DE" sz="2000" dirty="0" err="1">
+                <a:latin typeface="Arial" panose="020B0604020202020204" pitchFamily="34" charset="0"/>
+                <a:cs typeface="Arial" panose="020B0604020202020204" pitchFamily="34" charset="0"/>
+              </a:rPr>
+              <a:t>of</a:t>
+            </a:r>
+            <a:r>
+              <a:rPr lang="de-DE" sz="2000" dirty="0">
+                <a:latin typeface="Arial" panose="020B0604020202020204" pitchFamily="34" charset="0"/>
+                <a:cs typeface="Arial" panose="020B0604020202020204" pitchFamily="34" charset="0"/>
+              </a:rPr>
+              <a:t> a </a:t>
+            </a:r>
+            <a:r>
+              <a:rPr lang="de-DE" sz="2000" dirty="0" err="1">
+                <a:latin typeface="Arial" panose="020B0604020202020204" pitchFamily="34" charset="0"/>
+                <a:cs typeface="Arial" panose="020B0604020202020204" pitchFamily="34" charset="0"/>
+              </a:rPr>
+              <a:t>historic</a:t>
+            </a:r>
+            <a:r>
+              <a:rPr lang="de-DE" sz="2000" dirty="0">
+                <a:latin typeface="Arial" panose="020B0604020202020204" pitchFamily="34" charset="0"/>
+                <a:cs typeface="Arial" panose="020B0604020202020204" pitchFamily="34" charset="0"/>
+              </a:rPr>
+              <a:t> </a:t>
+            </a:r>
+            <a:r>
+              <a:rPr lang="de-DE" sz="2000" dirty="0" err="1">
+                <a:latin typeface="Arial" panose="020B0604020202020204" pitchFamily="34" charset="0"/>
+                <a:cs typeface="Arial" panose="020B0604020202020204" pitchFamily="34" charset="0"/>
+              </a:rPr>
+              <a:t>house</a:t>
+            </a:r>
+            <a:r>
+              <a:rPr lang="de-DE" sz="2000" dirty="0">
+                <a:latin typeface="Arial" panose="020B0604020202020204" pitchFamily="34" charset="0"/>
+                <a:cs typeface="Arial" panose="020B0604020202020204" pitchFamily="34" charset="0"/>
+              </a:rPr>
+              <a:t>.</a:t>
             </a:r>
           </a:p>
         </p:txBody>

</xml_diff>

<commit_message>
EDA exercise - Version 8
</commit_message>
<xml_diff>
--- a/EDA_presentation.pptx
+++ b/EDA_presentation.pptx
@@ -4109,7 +4109,7 @@
         </p:spPr>
         <p:txBody>
           <a:bodyPr anchor="ctr">
-            <a:normAutofit/>
+            <a:normAutofit fontScale="92500"/>
           </a:bodyPr>
           <a:lstStyle/>
           <a:p>
@@ -4121,7 +4121,7 @@
                 <a:latin typeface="Arial" panose="020B0604020202020204" pitchFamily="34" charset="0"/>
                 <a:cs typeface="Arial" panose="020B0604020202020204" pitchFamily="34" charset="0"/>
               </a:rPr>
-              <a:t>Exploratory data analysis</a:t>
+              <a:t>Exploratory data analysis (by Julia Nowak)</a:t>
             </a:r>
             <a:br>
               <a:rPr lang="en-DE" sz="2000" dirty="0">

</xml_diff>